<commit_message>
more doc update + gfx sources added
</commit_message>
<xml_diff>
--- a/docs/WIP/Staffr concept v1 slides 1-2.pptx
+++ b/docs/WIP/Staffr concept v1 slides 1-2.pptx
@@ -5,16 +5,17 @@
     <p:sldMasterId id="2147483648" r:id="rId5"/>
   </p:sldMasterIdLst>
   <p:notesMasterIdLst>
-    <p:notesMasterId r:id="rId8"/>
+    <p:notesMasterId r:id="rId9"/>
   </p:notesMasterIdLst>
   <p:sldIdLst>
     <p:sldId id="257" r:id="rId6"/>
     <p:sldId id="260" r:id="rId7"/>
+    <p:sldId id="261" r:id="rId8"/>
   </p:sldIdLst>
   <p:sldSz cx="9906000" cy="6858000" type="A4"/>
   <p:notesSz cx="6858000" cy="9144000"/>
   <p:custDataLst>
-    <p:tags r:id="rId9"/>
+    <p:tags r:id="rId10"/>
   </p:custDataLst>
   <p:defaultTextStyle>
     <a:defPPr>
@@ -227,7 +228,7 @@
             <a:fld id="{FA75A6CE-42F9-4E01-AD14-17456ACECB09}" type="datetimeFigureOut">
               <a:rPr lang="en-US" smtClean="0"/>
               <a:pPr/>
-              <a:t>7/28/2017</a:t>
+              <a:t>8/11/2017</a:t>
             </a:fld>
             <a:endParaRPr lang="en-US"/>
           </a:p>
@@ -899,7 +900,7 @@
           <a:graphicData uri="http://schemas.openxmlformats.org/presentationml/2006/ole">
             <mc:AlternateContent xmlns:mc="http://schemas.openxmlformats.org/markup-compatibility/2006">
               <mc:Choice xmlns:v="urn:schemas-microsoft-com:vml" Requires="v">
-                <p:oleObj spid="_x0000_s3079" name="think-cell Slide" r:id="rId4" imgW="270" imgH="270" progId="TCLayout.ActiveDocument.1">
+                <p:oleObj spid="_x0000_s3082" name="think-cell Slide" r:id="rId4" imgW="270" imgH="270" progId="TCLayout.ActiveDocument.1">
                   <p:embed/>
                 </p:oleObj>
               </mc:Choice>
@@ -1318,7 +1319,7 @@
           <a:graphicData uri="http://schemas.openxmlformats.org/presentationml/2006/ole">
             <mc:AlternateContent xmlns:mc="http://schemas.openxmlformats.org/markup-compatibility/2006">
               <mc:Choice xmlns:v="urn:schemas-microsoft-com:vml" Requires="v">
-                <p:oleObj spid="_x0000_s1035" name="think-cell Slide" r:id="rId4" imgW="270" imgH="270" progId="TCLayout.ActiveDocument.1">
+                <p:oleObj spid="_x0000_s1038" name="think-cell Slide" r:id="rId4" imgW="270" imgH="270" progId="TCLayout.ActiveDocument.1">
                   <p:embed/>
                 </p:oleObj>
               </mc:Choice>
@@ -1648,7 +1649,7 @@
           <a:graphicData uri="http://schemas.openxmlformats.org/presentationml/2006/ole">
             <mc:AlternateContent xmlns:mc="http://schemas.openxmlformats.org/markup-compatibility/2006">
               <mc:Choice xmlns:v="urn:schemas-microsoft-com:vml" Requires="v">
-                <p:oleObj spid="_x0000_s2059" name="think-cell Slide" r:id="rId12" imgW="270" imgH="270" progId="TCLayout.ActiveDocument.1">
+                <p:oleObj spid="_x0000_s2062" name="think-cell Slide" r:id="rId12" imgW="270" imgH="270" progId="TCLayout.ActiveDocument.1">
                   <p:embed/>
                 </p:oleObj>
               </mc:Choice>
@@ -2573,11 +2574,7 @@
             </a:r>
             <a:r>
               <a:rPr lang="en-US" smtClean="0"/>
-              <a:t>	</a:t>
-            </a:r>
-            <a:r>
-              <a:rPr lang="en-US" smtClean="0"/>
-              <a:t>31.</a:t>
+              <a:t>	31.</a:t>
             </a:r>
             <a:r>
               <a:rPr lang="cs-CZ" smtClean="0"/>
@@ -2669,7 +2666,7 @@
           <a:graphicData uri="http://schemas.openxmlformats.org/presentationml/2006/ole">
             <mc:AlternateContent xmlns:mc="http://schemas.openxmlformats.org/markup-compatibility/2006">
               <mc:Choice xmlns:v="urn:schemas-microsoft-com:vml" Requires="v">
-                <p:oleObj spid="_x0000_s4103" name="think-cell Slide" r:id="rId97" imgW="270" imgH="270" progId="TCLayout.ActiveDocument.1">
+                <p:oleObj spid="_x0000_s4106" name="think-cell Slide" r:id="rId97" imgW="270" imgH="270" progId="TCLayout.ActiveDocument.1">
                   <p:embed/>
                 </p:oleObj>
               </mc:Choice>
@@ -13299,6 +13296,712 @@
     <p:extLst>
       <p:ext uri="{BB962C8B-B14F-4D97-AF65-F5344CB8AC3E}">
         <p14:creationId xmlns:p14="http://schemas.microsoft.com/office/powerpoint/2010/main" val="1863485248"/>
+      </p:ext>
+    </p:extLst>
+  </p:cSld>
+  <p:clrMapOvr>
+    <a:masterClrMapping/>
+  </p:clrMapOvr>
+  <p:timing>
+    <p:tnLst>
+      <p:par>
+        <p:cTn id="1" dur="indefinite" restart="never" nodeType="tmRoot"/>
+      </p:par>
+    </p:tnLst>
+  </p:timing>
+</p:sld>
+</file>
+
+<file path=ppt/slides/slide3.xml><?xml version="1.0" encoding="utf-8"?>
+<p:sld xmlns:a="http://schemas.openxmlformats.org/drawingml/2006/main" xmlns:r="http://schemas.openxmlformats.org/officeDocument/2006/relationships" xmlns:p="http://schemas.openxmlformats.org/presentationml/2006/main">
+  <p:cSld>
+    <p:spTree>
+      <p:nvGrpSpPr>
+        <p:cNvPr id="1" name=""/>
+        <p:cNvGrpSpPr/>
+        <p:nvPr/>
+      </p:nvGrpSpPr>
+      <p:grpSpPr>
+        <a:xfrm>
+          <a:off x="0" y="0"/>
+          <a:ext cx="0" cy="0"/>
+          <a:chOff x="0" y="0"/>
+          <a:chExt cx="0" cy="0"/>
+        </a:xfrm>
+      </p:grpSpPr>
+      <p:sp>
+        <p:nvSpPr>
+          <p:cNvPr id="2" name="Title 1"/>
+          <p:cNvSpPr>
+            <a:spLocks noGrp="1"/>
+          </p:cNvSpPr>
+          <p:nvPr>
+            <p:ph type="title"/>
+          </p:nvPr>
+        </p:nvSpPr>
+        <p:spPr/>
+        <p:txBody>
+          <a:bodyPr/>
+          <a:lstStyle/>
+          <a:p>
+            <a:r>
+              <a:rPr lang="en-US" sz="2800" dirty="0" smtClean="0"/>
+              <a:t>Technologies used</a:t>
+            </a:r>
+            <a:endParaRPr lang="cs-CZ" sz="2800" dirty="0"/>
+          </a:p>
+        </p:txBody>
+      </p:sp>
+      <p:grpSp>
+        <p:nvGrpSpPr>
+          <p:cNvPr id="21" name="Group 20"/>
+          <p:cNvGrpSpPr/>
+          <p:nvPr/>
+        </p:nvGrpSpPr>
+        <p:grpSpPr>
+          <a:xfrm>
+            <a:off x="6853443" y="4290740"/>
+            <a:ext cx="2088776" cy="2088776"/>
+            <a:chOff x="3007659" y="4781183"/>
+            <a:chExt cx="1394161" cy="1394161"/>
+          </a:xfrm>
+        </p:grpSpPr>
+        <p:pic>
+          <p:nvPicPr>
+            <p:cNvPr id="22534" name="Picture 6" descr="Výsledek obrázku"/>
+            <p:cNvPicPr>
+              <a:picLocks noChangeAspect="1" noChangeArrowheads="1"/>
+            </p:cNvPicPr>
+            <p:nvPr/>
+          </p:nvPicPr>
+          <p:blipFill>
+            <a:blip r:embed="rId2" cstate="print">
+              <a:extLst>
+                <a:ext uri="{28A0092B-C50C-407E-A947-70E740481C1C}">
+                  <a14:useLocalDpi xmlns:a14="http://schemas.microsoft.com/office/drawing/2010/main" val="0"/>
+                </a:ext>
+              </a:extLst>
+            </a:blip>
+            <a:srcRect/>
+            <a:stretch>
+              <a:fillRect/>
+            </a:stretch>
+          </p:blipFill>
+          <p:spPr bwMode="auto">
+            <a:xfrm>
+              <a:off x="3245153" y="4901026"/>
+              <a:ext cx="919174" cy="1021304"/>
+            </a:xfrm>
+            <a:prstGeom prst="rect">
+              <a:avLst/>
+            </a:prstGeom>
+            <a:noFill/>
+            <a:extLst>
+              <a:ext uri="{909E8E84-426E-40DD-AFC4-6F175D3DCCD1}">
+                <a14:hiddenFill xmlns:a14="http://schemas.microsoft.com/office/drawing/2010/main">
+                  <a:solidFill>
+                    <a:srgbClr val="FFFFFF"/>
+                  </a:solidFill>
+                </a14:hiddenFill>
+              </a:ext>
+            </a:extLst>
+          </p:spPr>
+        </p:pic>
+        <p:sp>
+          <p:nvSpPr>
+            <p:cNvPr id="3" name="Oval 2"/>
+            <p:cNvSpPr/>
+            <p:nvPr/>
+          </p:nvSpPr>
+          <p:spPr>
+            <a:xfrm>
+              <a:off x="3007659" y="4781183"/>
+              <a:ext cx="1394161" cy="1394161"/>
+            </a:xfrm>
+            <a:prstGeom prst="ellipse">
+              <a:avLst/>
+            </a:prstGeom>
+            <a:noFill/>
+            <a:ln w="38100">
+              <a:solidFill>
+                <a:schemeClr val="bg1">
+                  <a:lumMod val="75000"/>
+                </a:schemeClr>
+              </a:solidFill>
+            </a:ln>
+            <a:effectLst/>
+          </p:spPr>
+          <p:style>
+            <a:lnRef idx="2">
+              <a:schemeClr val="accent1">
+                <a:shade val="50000"/>
+              </a:schemeClr>
+            </a:lnRef>
+            <a:fillRef idx="1">
+              <a:schemeClr val="accent1"/>
+            </a:fillRef>
+            <a:effectRef idx="0">
+              <a:schemeClr val="accent1"/>
+            </a:effectRef>
+            <a:fontRef idx="minor">
+              <a:schemeClr val="lt1"/>
+            </a:fontRef>
+          </p:style>
+          <p:txBody>
+            <a:bodyPr tIns="90000" bIns="90000" rtlCol="0" anchor="ctr" anchorCtr="0"/>
+            <a:lstStyle/>
+            <a:p>
+              <a:pPr algn="ctr"/>
+              <a:endParaRPr lang="cs-CZ" sz="2000" dirty="0" smtClean="0">
+                <a:solidFill>
+                  <a:schemeClr val="tx1"/>
+                </a:solidFill>
+              </a:endParaRPr>
+            </a:p>
+          </p:txBody>
+        </p:sp>
+      </p:grpSp>
+      <p:grpSp>
+        <p:nvGrpSpPr>
+          <p:cNvPr id="20" name="Group 19"/>
+          <p:cNvGrpSpPr/>
+          <p:nvPr/>
+        </p:nvGrpSpPr>
+        <p:grpSpPr>
+          <a:xfrm>
+            <a:off x="6853443" y="1340973"/>
+            <a:ext cx="2088776" cy="2088776"/>
+            <a:chOff x="5504180" y="4781183"/>
+            <a:chExt cx="1394161" cy="1394161"/>
+          </a:xfrm>
+        </p:grpSpPr>
+        <p:pic>
+          <p:nvPicPr>
+            <p:cNvPr id="22532" name="Picture 4" descr="Související obrázek"/>
+            <p:cNvPicPr>
+              <a:picLocks noChangeAspect="1" noChangeArrowheads="1"/>
+            </p:cNvPicPr>
+            <p:nvPr/>
+          </p:nvPicPr>
+          <p:blipFill>
+            <a:blip r:embed="rId3" cstate="print">
+              <a:extLst>
+                <a:ext uri="{28A0092B-C50C-407E-A947-70E740481C1C}">
+                  <a14:useLocalDpi xmlns:a14="http://schemas.microsoft.com/office/drawing/2010/main" val="0"/>
+                </a:ext>
+              </a:extLst>
+            </a:blip>
+            <a:srcRect/>
+            <a:stretch>
+              <a:fillRect/>
+            </a:stretch>
+          </p:blipFill>
+          <p:spPr bwMode="auto">
+            <a:xfrm>
+              <a:off x="5610741" y="5035129"/>
+              <a:ext cx="1287600" cy="886270"/>
+            </a:xfrm>
+            <a:prstGeom prst="rect">
+              <a:avLst/>
+            </a:prstGeom>
+            <a:noFill/>
+            <a:extLst>
+              <a:ext uri="{909E8E84-426E-40DD-AFC4-6F175D3DCCD1}">
+                <a14:hiddenFill xmlns:a14="http://schemas.microsoft.com/office/drawing/2010/main">
+                  <a:solidFill>
+                    <a:srgbClr val="FFFFFF"/>
+                  </a:solidFill>
+                </a14:hiddenFill>
+              </a:ext>
+            </a:extLst>
+          </p:spPr>
+        </p:pic>
+        <p:sp>
+          <p:nvSpPr>
+            <p:cNvPr id="8" name="Oval 7"/>
+            <p:cNvSpPr/>
+            <p:nvPr/>
+          </p:nvSpPr>
+          <p:spPr>
+            <a:xfrm>
+              <a:off x="5504180" y="4781183"/>
+              <a:ext cx="1394161" cy="1394161"/>
+            </a:xfrm>
+            <a:prstGeom prst="ellipse">
+              <a:avLst/>
+            </a:prstGeom>
+            <a:noFill/>
+            <a:ln w="38100">
+              <a:solidFill>
+                <a:schemeClr val="bg1">
+                  <a:lumMod val="75000"/>
+                </a:schemeClr>
+              </a:solidFill>
+            </a:ln>
+            <a:effectLst/>
+          </p:spPr>
+          <p:style>
+            <a:lnRef idx="2">
+              <a:schemeClr val="accent1">
+                <a:shade val="50000"/>
+              </a:schemeClr>
+            </a:lnRef>
+            <a:fillRef idx="1">
+              <a:schemeClr val="accent1"/>
+            </a:fillRef>
+            <a:effectRef idx="0">
+              <a:schemeClr val="accent1"/>
+            </a:effectRef>
+            <a:fontRef idx="minor">
+              <a:schemeClr val="lt1"/>
+            </a:fontRef>
+          </p:style>
+          <p:txBody>
+            <a:bodyPr tIns="90000" bIns="90000" rtlCol="0" anchor="ctr" anchorCtr="0"/>
+            <a:lstStyle/>
+            <a:p>
+              <a:pPr algn="ctr"/>
+              <a:endParaRPr lang="cs-CZ" sz="2000" dirty="0" smtClean="0">
+                <a:solidFill>
+                  <a:schemeClr val="tx1"/>
+                </a:solidFill>
+              </a:endParaRPr>
+            </a:p>
+          </p:txBody>
+        </p:sp>
+      </p:grpSp>
+      <p:grpSp>
+        <p:nvGrpSpPr>
+          <p:cNvPr id="19" name="Group 18"/>
+          <p:cNvGrpSpPr/>
+          <p:nvPr/>
+        </p:nvGrpSpPr>
+        <p:grpSpPr>
+          <a:xfrm>
+            <a:off x="4255920" y="2815857"/>
+            <a:ext cx="2088776" cy="2088776"/>
+            <a:chOff x="4255920" y="3322768"/>
+            <a:chExt cx="1394161" cy="1394161"/>
+          </a:xfrm>
+        </p:grpSpPr>
+        <p:pic>
+          <p:nvPicPr>
+            <p:cNvPr id="22530" name="Picture 2" descr="Výsledek obrázku"/>
+            <p:cNvPicPr>
+              <a:picLocks noChangeAspect="1" noChangeArrowheads="1"/>
+            </p:cNvPicPr>
+            <p:nvPr/>
+          </p:nvPicPr>
+          <p:blipFill>
+            <a:blip r:embed="rId4" cstate="print">
+              <a:extLst>
+                <a:ext uri="{28A0092B-C50C-407E-A947-70E740481C1C}">
+                  <a14:useLocalDpi xmlns:a14="http://schemas.microsoft.com/office/drawing/2010/main" val="0"/>
+                </a:ext>
+              </a:extLst>
+            </a:blip>
+            <a:srcRect/>
+            <a:stretch>
+              <a:fillRect/>
+            </a:stretch>
+          </p:blipFill>
+          <p:spPr bwMode="auto">
+            <a:xfrm>
+              <a:off x="4477781" y="3383110"/>
+              <a:ext cx="1020403" cy="1086486"/>
+            </a:xfrm>
+            <a:prstGeom prst="rect">
+              <a:avLst/>
+            </a:prstGeom>
+            <a:noFill/>
+            <a:extLst>
+              <a:ext uri="{909E8E84-426E-40DD-AFC4-6F175D3DCCD1}">
+                <a14:hiddenFill xmlns:a14="http://schemas.microsoft.com/office/drawing/2010/main">
+                  <a:solidFill>
+                    <a:srgbClr val="FFFFFF"/>
+                  </a:solidFill>
+                </a14:hiddenFill>
+              </a:ext>
+            </a:extLst>
+          </p:spPr>
+        </p:pic>
+        <p:sp>
+          <p:nvSpPr>
+            <p:cNvPr id="10" name="Oval 9"/>
+            <p:cNvSpPr/>
+            <p:nvPr/>
+          </p:nvSpPr>
+          <p:spPr>
+            <a:xfrm>
+              <a:off x="4255920" y="3322768"/>
+              <a:ext cx="1394161" cy="1394161"/>
+            </a:xfrm>
+            <a:prstGeom prst="ellipse">
+              <a:avLst/>
+            </a:prstGeom>
+            <a:noFill/>
+            <a:ln w="38100">
+              <a:solidFill>
+                <a:schemeClr val="bg1">
+                  <a:lumMod val="75000"/>
+                </a:schemeClr>
+              </a:solidFill>
+            </a:ln>
+            <a:effectLst/>
+          </p:spPr>
+          <p:style>
+            <a:lnRef idx="2">
+              <a:schemeClr val="accent1">
+                <a:shade val="50000"/>
+              </a:schemeClr>
+            </a:lnRef>
+            <a:fillRef idx="1">
+              <a:schemeClr val="accent1"/>
+            </a:fillRef>
+            <a:effectRef idx="0">
+              <a:schemeClr val="accent1"/>
+            </a:effectRef>
+            <a:fontRef idx="minor">
+              <a:schemeClr val="lt1"/>
+            </a:fontRef>
+          </p:style>
+          <p:txBody>
+            <a:bodyPr tIns="90000" bIns="90000" rtlCol="0" anchor="ctr" anchorCtr="0"/>
+            <a:lstStyle/>
+            <a:p>
+              <a:pPr algn="ctr"/>
+              <a:endParaRPr lang="cs-CZ" sz="2000" dirty="0" smtClean="0">
+                <a:solidFill>
+                  <a:schemeClr val="tx1"/>
+                </a:solidFill>
+              </a:endParaRPr>
+            </a:p>
+          </p:txBody>
+        </p:sp>
+      </p:grpSp>
+      <p:cxnSp>
+        <p:nvCxnSpPr>
+          <p:cNvPr id="6" name="Straight Arrow Connector 5"/>
+          <p:cNvCxnSpPr>
+            <a:stCxn id="10" idx="7"/>
+            <a:endCxn id="8" idx="2"/>
+          </p:cNvCxnSpPr>
+          <p:nvPr/>
+        </p:nvCxnSpPr>
+        <p:spPr>
+          <a:xfrm flipV="1">
+            <a:off x="6038802" y="2385361"/>
+            <a:ext cx="814641" cy="736390"/>
+          </a:xfrm>
+          <a:prstGeom prst="straightConnector1">
+            <a:avLst/>
+          </a:prstGeom>
+          <a:ln w="38100">
+            <a:solidFill>
+              <a:schemeClr val="bg2"/>
+            </a:solidFill>
+            <a:prstDash val="sysDash"/>
+            <a:headEnd type="stealth" w="lg" len="lg"/>
+            <a:tailEnd type="stealth" w="lg" len="lg"/>
+          </a:ln>
+        </p:spPr>
+        <p:style>
+          <a:lnRef idx="1">
+            <a:schemeClr val="accent1"/>
+          </a:lnRef>
+          <a:fillRef idx="0">
+            <a:schemeClr val="accent1"/>
+          </a:fillRef>
+          <a:effectRef idx="0">
+            <a:schemeClr val="accent1"/>
+          </a:effectRef>
+          <a:fontRef idx="minor">
+            <a:schemeClr val="tx1"/>
+          </a:fontRef>
+        </p:style>
+      </p:cxnSp>
+      <p:cxnSp>
+        <p:nvCxnSpPr>
+          <p:cNvPr id="14" name="Straight Arrow Connector 13"/>
+          <p:cNvCxnSpPr>
+            <a:stCxn id="3" idx="0"/>
+            <a:endCxn id="8" idx="4"/>
+          </p:cNvCxnSpPr>
+          <p:nvPr/>
+        </p:nvCxnSpPr>
+        <p:spPr>
+          <a:xfrm flipV="1">
+            <a:off x="7897831" y="3429749"/>
+            <a:ext cx="0" cy="860991"/>
+          </a:xfrm>
+          <a:prstGeom prst="straightConnector1">
+            <a:avLst/>
+          </a:prstGeom>
+          <a:ln w="38100">
+            <a:solidFill>
+              <a:schemeClr val="bg2"/>
+            </a:solidFill>
+            <a:headEnd type="stealth" w="lg" len="lg"/>
+            <a:tailEnd type="stealth" w="lg" len="lg"/>
+          </a:ln>
+        </p:spPr>
+        <p:style>
+          <a:lnRef idx="1">
+            <a:schemeClr val="accent1"/>
+          </a:lnRef>
+          <a:fillRef idx="0">
+            <a:schemeClr val="accent1"/>
+          </a:fillRef>
+          <a:effectRef idx="0">
+            <a:schemeClr val="accent1"/>
+          </a:effectRef>
+          <a:fontRef idx="minor">
+            <a:schemeClr val="tx1"/>
+          </a:fontRef>
+        </p:style>
+      </p:cxnSp>
+      <p:cxnSp>
+        <p:nvCxnSpPr>
+          <p:cNvPr id="15" name="Straight Arrow Connector 14"/>
+          <p:cNvCxnSpPr>
+            <a:stCxn id="10" idx="5"/>
+          </p:cNvCxnSpPr>
+          <p:nvPr/>
+        </p:nvCxnSpPr>
+        <p:spPr>
+          <a:xfrm>
+            <a:off x="6038802" y="4598739"/>
+            <a:ext cx="814641" cy="796323"/>
+          </a:xfrm>
+          <a:prstGeom prst="straightConnector1">
+            <a:avLst/>
+          </a:prstGeom>
+          <a:ln w="38100">
+            <a:solidFill>
+              <a:schemeClr val="bg2"/>
+            </a:solidFill>
+            <a:headEnd type="stealth" w="lg" len="lg"/>
+            <a:tailEnd type="stealth" w="lg" len="lg"/>
+          </a:ln>
+        </p:spPr>
+        <p:style>
+          <a:lnRef idx="1">
+            <a:schemeClr val="accent1"/>
+          </a:lnRef>
+          <a:fillRef idx="0">
+            <a:schemeClr val="accent1"/>
+          </a:fillRef>
+          <a:effectRef idx="0">
+            <a:schemeClr val="accent1"/>
+          </a:effectRef>
+          <a:fontRef idx="minor">
+            <a:schemeClr val="tx1"/>
+          </a:fontRef>
+        </p:style>
+      </p:cxnSp>
+      <p:cxnSp>
+        <p:nvCxnSpPr>
+          <p:cNvPr id="17" name="Straight Arrow Connector 16"/>
+          <p:cNvCxnSpPr>
+            <a:stCxn id="16" idx="6"/>
+            <a:endCxn id="10" idx="2"/>
+          </p:cNvCxnSpPr>
+          <p:nvPr/>
+        </p:nvCxnSpPr>
+        <p:spPr>
+          <a:xfrm>
+            <a:off x="3251872" y="3860245"/>
+            <a:ext cx="1004048" cy="0"/>
+          </a:xfrm>
+          <a:prstGeom prst="straightConnector1">
+            <a:avLst/>
+          </a:prstGeom>
+          <a:ln w="38100">
+            <a:solidFill>
+              <a:schemeClr val="bg2"/>
+            </a:solidFill>
+            <a:headEnd type="stealth" w="lg" len="lg"/>
+            <a:tailEnd type="none" w="lg" len="lg"/>
+          </a:ln>
+        </p:spPr>
+        <p:style>
+          <a:lnRef idx="1">
+            <a:schemeClr val="accent1"/>
+          </a:lnRef>
+          <a:fillRef idx="0">
+            <a:schemeClr val="accent1"/>
+          </a:fillRef>
+          <a:effectRef idx="0">
+            <a:schemeClr val="accent1"/>
+          </a:effectRef>
+          <a:fontRef idx="minor">
+            <a:schemeClr val="tx1"/>
+          </a:fontRef>
+        </p:style>
+      </p:cxnSp>
+      <p:grpSp>
+        <p:nvGrpSpPr>
+          <p:cNvPr id="13" name="Group 12"/>
+          <p:cNvGrpSpPr/>
+          <p:nvPr/>
+        </p:nvGrpSpPr>
+        <p:grpSpPr>
+          <a:xfrm>
+            <a:off x="1163096" y="2815857"/>
+            <a:ext cx="2088776" cy="2088776"/>
+            <a:chOff x="4255920" y="1527599"/>
+            <a:chExt cx="1394161" cy="1394161"/>
+          </a:xfrm>
+        </p:grpSpPr>
+        <p:sp>
+          <p:nvSpPr>
+            <p:cNvPr id="16" name="Oval 15"/>
+            <p:cNvSpPr/>
+            <p:nvPr/>
+          </p:nvSpPr>
+          <p:spPr>
+            <a:xfrm>
+              <a:off x="4255920" y="1527599"/>
+              <a:ext cx="1394161" cy="1394161"/>
+            </a:xfrm>
+            <a:prstGeom prst="ellipse">
+              <a:avLst/>
+            </a:prstGeom>
+            <a:noFill/>
+            <a:ln w="38100">
+              <a:solidFill>
+                <a:schemeClr val="bg1">
+                  <a:lumMod val="75000"/>
+                </a:schemeClr>
+              </a:solidFill>
+            </a:ln>
+            <a:effectLst/>
+          </p:spPr>
+          <p:style>
+            <a:lnRef idx="2">
+              <a:schemeClr val="accent1">
+                <a:shade val="50000"/>
+              </a:schemeClr>
+            </a:lnRef>
+            <a:fillRef idx="1">
+              <a:schemeClr val="accent1"/>
+            </a:fillRef>
+            <a:effectRef idx="0">
+              <a:schemeClr val="accent1"/>
+            </a:effectRef>
+            <a:fontRef idx="minor">
+              <a:schemeClr val="lt1"/>
+            </a:fontRef>
+          </p:style>
+          <p:txBody>
+            <a:bodyPr tIns="90000" bIns="90000" rtlCol="0" anchor="ctr" anchorCtr="0"/>
+            <a:lstStyle/>
+            <a:p>
+              <a:pPr algn="ctr"/>
+              <a:endParaRPr lang="cs-CZ" sz="2000" dirty="0" smtClean="0">
+                <a:solidFill>
+                  <a:schemeClr val="tx1"/>
+                </a:solidFill>
+              </a:endParaRPr>
+            </a:p>
+          </p:txBody>
+        </p:sp>
+        <p:pic>
+          <p:nvPicPr>
+            <p:cNvPr id="11" name="Picture 10"/>
+            <p:cNvPicPr>
+              <a:picLocks noChangeAspect="1"/>
+            </p:cNvPicPr>
+            <p:nvPr/>
+          </p:nvPicPr>
+          <p:blipFill>
+            <a:blip r:embed="rId5" cstate="print">
+              <a:extLst>
+                <a:ext uri="{28A0092B-C50C-407E-A947-70E740481C1C}">
+                  <a14:useLocalDpi xmlns:a14="http://schemas.microsoft.com/office/drawing/2010/main" val="0"/>
+                </a:ext>
+              </a:extLst>
+            </a:blip>
+            <a:stretch>
+              <a:fillRect/>
+            </a:stretch>
+          </p:blipFill>
+          <p:spPr>
+            <a:xfrm>
+              <a:off x="4572966" y="1749419"/>
+              <a:ext cx="756264" cy="680010"/>
+            </a:xfrm>
+            <a:prstGeom prst="rect">
+              <a:avLst/>
+            </a:prstGeom>
+          </p:spPr>
+        </p:pic>
+        <p:sp>
+          <p:nvSpPr>
+            <p:cNvPr id="12" name="Rectangle 11"/>
+            <p:cNvSpPr/>
+            <p:nvPr/>
+          </p:nvSpPr>
+          <p:spPr>
+            <a:xfrm>
+              <a:off x="4394481" y="2371248"/>
+              <a:ext cx="1117040" cy="340665"/>
+            </a:xfrm>
+            <a:prstGeom prst="rect">
+              <a:avLst/>
+            </a:prstGeom>
+            <a:noFill/>
+            <a:ln w="9525">
+              <a:noFill/>
+            </a:ln>
+            <a:effectLst/>
+          </p:spPr>
+          <p:style>
+            <a:lnRef idx="2">
+              <a:schemeClr val="accent1">
+                <a:shade val="50000"/>
+              </a:schemeClr>
+            </a:lnRef>
+            <a:fillRef idx="1">
+              <a:schemeClr val="accent1"/>
+            </a:fillRef>
+            <a:effectRef idx="0">
+              <a:schemeClr val="accent1"/>
+            </a:effectRef>
+            <a:fontRef idx="minor">
+              <a:schemeClr val="lt1"/>
+            </a:fontRef>
+          </p:style>
+          <p:txBody>
+            <a:bodyPr tIns="90000" bIns="90000" rtlCol="0" anchor="ctr" anchorCtr="0"/>
+            <a:lstStyle/>
+            <a:p>
+              <a:pPr algn="ctr"/>
+              <a:r>
+                <a:rPr lang="cs-CZ" sz="2000" b="1" i="1" dirty="0" err="1" smtClean="0">
+                  <a:solidFill>
+                    <a:srgbClr val="53C1DE"/>
+                  </a:solidFill>
+                  <a:latin typeface="Arial" pitchFamily="34" charset="0"/>
+                  <a:cs typeface="Arial" pitchFamily="34" charset="0"/>
+                </a:rPr>
+                <a:t>ReactJS</a:t>
+              </a:r>
+              <a:endParaRPr lang="cs-CZ" sz="2000" b="1" i="1" dirty="0" smtClean="0">
+                <a:solidFill>
+                  <a:srgbClr val="53C1DE"/>
+                </a:solidFill>
+                <a:latin typeface="Arial" pitchFamily="34" charset="0"/>
+                <a:cs typeface="Arial" pitchFamily="34" charset="0"/>
+              </a:endParaRPr>
+            </a:p>
+          </p:txBody>
+        </p:sp>
+      </p:grpSp>
+    </p:spTree>
+    <p:extLst>
+      <p:ext uri="{BB962C8B-B14F-4D97-AF65-F5344CB8AC3E}">
+        <p14:creationId xmlns:p14="http://schemas.microsoft.com/office/powerpoint/2010/main" val="3436814267"/>
       </p:ext>
     </p:extLst>
   </p:cSld>
@@ -14514,39 +15217,6 @@
 </file>
 
 <file path=customXml/item1.xml><?xml version="1.0" encoding="utf-8"?>
-<p:properties xmlns:p="http://schemas.microsoft.com/office/2006/metadata/properties" xmlns:xsi="http://www.w3.org/2001/XMLSchema-instance">
-  <documentManagement/>
-</p:properties>
-</file>
-
-<file path=customXml/item2.xml><?xml version="1.0" encoding="utf-8"?>
-<?mso-contentType ?>
-<FormTemplates xmlns="http://schemas.microsoft.com/sharepoint/v3/contenttype/forms">
-  <Display>DocumentLibraryForm</Display>
-  <Edit>DocumentLibraryForm</Edit>
-  <New>DocumentLibraryForm</New>
-</FormTemplates>
-</file>
-
-<file path=customXml/item3.xml><?xml version="1.0" encoding="utf-8"?>
-<?mso-contentType ?>
-<rca:RCAuthoringProperties xmlns:rca="urn:sharePointPublishingRcaProperties">
-  <rca:Converter rca:guid="6dfdc5b4-2a28-4a06-b0c6-ad3901e3a807">
-    <rca:property rca:type="InheritParentSettings">False</rca:property>
-    <rca:property rca:type="SelectedPageLayout">24</rca:property>
-    <rca:property rca:type="SelectedPageField">f55c4d88-1f2e-4ad9-aaa8-819af4ee7ee8</rca:property>
-    <rca:property rca:type="SelectedStylesField">a932ec3f-94c1-48b1-b6dc-41aaa6eb7e54</rca:property>
-    <rca:property rca:type="CreatePageWithSourceDocument">True</rca:property>
-    <rca:property rca:type="AllowChangeLocationConfig">True</rca:property>
-    <rca:property rca:type="ConfiguredPageLocation">http://it-network.bcg.com/SiteDirectory/Sharepoint_Platform/TeamSites09/FarmDeploy/iptest</rca:property>
-    <rca:property rca:type="CreateSynchronously">False</rca:property>
-    <rca:property rca:type="AllowChangeProcessingConfig">True</rca:property>
-    <rca:property rca:type="ConverterSpecificSettings"/>
-  </rca:Converter>
-</rca:RCAuthoringProperties>
-</file>
-
-<file path=customXml/item4.xml><?xml version="1.0" encoding="utf-8"?>
 <ct:contentTypeSchema xmlns:ct="http://schemas.microsoft.com/office/2006/metadata/contentType" xmlns:ma="http://schemas.microsoft.com/office/2006/metadata/properties/metaAttributes" ct:_="" ma:_="" ma:contentTypeName="Document" ma:contentTypeID="0x0101009862B2F57513A547879471749A2268C3" ma:contentTypeVersion="1" ma:contentTypeDescription="Create a new document." ma:contentTypeScope="" ma:versionID="187b2ccb4db15664d5e0eaca524ea8a3">
   <xsd:schema xmlns:xsd="http://www.w3.org/2001/XMLSchema" xmlns:p="http://schemas.microsoft.com/office/2006/metadata/properties" targetNamespace="http://schemas.microsoft.com/office/2006/metadata/properties" ma:root="true" ma:fieldsID="876b2bb4dfc2b028f5344ecdeae42f3d">
     <xsd:element name="properties">
@@ -14595,31 +15265,40 @@
 </ct:contentTypeSchema>
 </file>
 
-<file path=customXml/itemProps1.xml><?xml version="1.0" encoding="utf-8"?>
-<ds:datastoreItem xmlns:ds="http://schemas.openxmlformats.org/officeDocument/2006/customXml" ds:itemID="{D2D2F14E-91D0-46BE-AF0B-03FA64177EC7}">
-  <ds:schemaRefs>
-    <ds:schemaRef ds:uri="http://schemas.microsoft.com/office/2006/metadata/properties"/>
-  </ds:schemaRefs>
-</ds:datastoreItem>
+<file path=customXml/item2.xml><?xml version="1.0" encoding="utf-8"?>
+<?mso-contentType ?>
+<rca:RCAuthoringProperties xmlns:rca="urn:sharePointPublishingRcaProperties">
+  <rca:Converter rca:guid="6dfdc5b4-2a28-4a06-b0c6-ad3901e3a807">
+    <rca:property rca:type="InheritParentSettings">False</rca:property>
+    <rca:property rca:type="SelectedPageLayout">24</rca:property>
+    <rca:property rca:type="SelectedPageField">f55c4d88-1f2e-4ad9-aaa8-819af4ee7ee8</rca:property>
+    <rca:property rca:type="SelectedStylesField">a932ec3f-94c1-48b1-b6dc-41aaa6eb7e54</rca:property>
+    <rca:property rca:type="CreatePageWithSourceDocument">True</rca:property>
+    <rca:property rca:type="AllowChangeLocationConfig">True</rca:property>
+    <rca:property rca:type="ConfiguredPageLocation">http://it-network.bcg.com/SiteDirectory/Sharepoint_Platform/TeamSites09/FarmDeploy/iptest</rca:property>
+    <rca:property rca:type="CreateSynchronously">False</rca:property>
+    <rca:property rca:type="AllowChangeProcessingConfig">True</rca:property>
+    <rca:property rca:type="ConverterSpecificSettings"/>
+  </rca:Converter>
+</rca:RCAuthoringProperties>
 </file>
 
-<file path=customXml/itemProps2.xml><?xml version="1.0" encoding="utf-8"?>
-<ds:datastoreItem xmlns:ds="http://schemas.openxmlformats.org/officeDocument/2006/customXml" ds:itemID="{7BF56AB9-1D7B-4EEB-B7B0-A85AED613A97}">
-  <ds:schemaRefs>
-    <ds:schemaRef ds:uri="http://schemas.microsoft.com/sharepoint/v3/contenttype/forms"/>
-  </ds:schemaRefs>
-</ds:datastoreItem>
+<file path=customXml/item3.xml><?xml version="1.0" encoding="utf-8"?>
+<?mso-contentType ?>
+<FormTemplates xmlns="http://schemas.microsoft.com/sharepoint/v3/contenttype/forms">
+  <Display>DocumentLibraryForm</Display>
+  <Edit>DocumentLibraryForm</Edit>
+  <New>DocumentLibraryForm</New>
+</FormTemplates>
 </file>
 
-<file path=customXml/itemProps3.xml><?xml version="1.0" encoding="utf-8"?>
-<ds:datastoreItem xmlns:ds="http://schemas.openxmlformats.org/officeDocument/2006/customXml" ds:itemID="{CB87F45E-89F2-4F93-BA38-4E759A2983DE}">
-  <ds:schemaRefs>
-    <ds:schemaRef ds:uri="urn:sharePointPublishingRcaProperties"/>
-  </ds:schemaRefs>
-</ds:datastoreItem>
+<file path=customXml/item4.xml><?xml version="1.0" encoding="utf-8"?>
+<p:properties xmlns:p="http://schemas.microsoft.com/office/2006/metadata/properties" xmlns:xsi="http://www.w3.org/2001/XMLSchema-instance">
+  <documentManagement/>
+</p:properties>
 </file>
 
-<file path=customXml/itemProps4.xml><?xml version="1.0" encoding="utf-8"?>
+<file path=customXml/itemProps1.xml><?xml version="1.0" encoding="utf-8"?>
 <ds:datastoreItem xmlns:ds="http://schemas.openxmlformats.org/officeDocument/2006/customXml" ds:itemID="{ABDB0175-C2BA-4739-B241-D8A48BED439F}">
   <ds:schemaRefs>
     <ds:schemaRef ds:uri="http://schemas.microsoft.com/office/2006/metadata/contentType"/>
@@ -14632,4 +15311,28 @@
     <ds:schemaRef ds:uri="http://schemas.microsoft.com/office/internal/2005/internalDocumentation"/>
   </ds:schemaRefs>
 </ds:datastoreItem>
+</file>
+
+<file path=customXml/itemProps2.xml><?xml version="1.0" encoding="utf-8"?>
+<ds:datastoreItem xmlns:ds="http://schemas.openxmlformats.org/officeDocument/2006/customXml" ds:itemID="{CB87F45E-89F2-4F93-BA38-4E759A2983DE}">
+  <ds:schemaRefs>
+    <ds:schemaRef ds:uri="urn:sharePointPublishingRcaProperties"/>
+  </ds:schemaRefs>
+</ds:datastoreItem>
+</file>
+
+<file path=customXml/itemProps3.xml><?xml version="1.0" encoding="utf-8"?>
+<ds:datastoreItem xmlns:ds="http://schemas.openxmlformats.org/officeDocument/2006/customXml" ds:itemID="{7BF56AB9-1D7B-4EEB-B7B0-A85AED613A97}">
+  <ds:schemaRefs>
+    <ds:schemaRef ds:uri="http://schemas.microsoft.com/sharepoint/v3/contenttype/forms"/>
+  </ds:schemaRefs>
+</ds:datastoreItem>
+</file>
+
+<file path=customXml/itemProps4.xml><?xml version="1.0" encoding="utf-8"?>
+<ds:datastoreItem xmlns:ds="http://schemas.openxmlformats.org/officeDocument/2006/customXml" ds:itemID="{D2D2F14E-91D0-46BE-AF0B-03FA64177EC7}">
+  <ds:schemaRefs>
+    <ds:schemaRef ds:uri="http://schemas.microsoft.com/office/2006/metadata/properties"/>
+  </ds:schemaRefs>
+</ds:datastoreItem>
 </file>
</xml_diff>